<commit_message>
Update no Desenho de Solução
Troca de icon para tomate.
</commit_message>
<xml_diff>
--- a/Desenho de Solução/Desenho de Solução.pptx
+++ b/Desenho de Solução/Desenho de Solução.pptx
@@ -104,6 +104,11 @@
       </a:defRPr>
     </a:lvl9pPr>
   </p:defaultTextStyle>
+  <p:extLst>
+    <p:ext uri="{EFAFB233-063F-42B5-8137-9DF3F51BA10A}">
+      <p15:sldGuideLst xmlns:p15="http://schemas.microsoft.com/office/powerpoint/2012/main"/>
+    </p:ext>
+  </p:extLst>
 </p:presentation>
 </file>
 
@@ -829,7 +834,7 @@
           <a:p>
             <a:fld id="{82869B3E-A76A-4689-B656-33BE798491C8}" type="datetimeFigureOut">
               <a:rPr lang="pt-BR" smtClean="0"/>
-              <a:t>12/09/2019</a:t>
+              <a:t>16/09/2019</a:t>
             </a:fld>
             <a:endParaRPr lang="pt-BR"/>
           </a:p>
@@ -1080,7 +1085,7 @@
           <a:p>
             <a:fld id="{82869B3E-A76A-4689-B656-33BE798491C8}" type="datetimeFigureOut">
               <a:rPr lang="pt-BR" smtClean="0"/>
-              <a:t>12/09/2019</a:t>
+              <a:t>16/09/2019</a:t>
             </a:fld>
             <a:endParaRPr lang="pt-BR"/>
           </a:p>
@@ -1394,7 +1399,7 @@
           <a:p>
             <a:fld id="{82869B3E-A76A-4689-B656-33BE798491C8}" type="datetimeFigureOut">
               <a:rPr lang="pt-BR" smtClean="0"/>
-              <a:t>12/09/2019</a:t>
+              <a:t>16/09/2019</a:t>
             </a:fld>
             <a:endParaRPr lang="pt-BR"/>
           </a:p>
@@ -1735,7 +1740,7 @@
           <a:p>
             <a:fld id="{82869B3E-A76A-4689-B656-33BE798491C8}" type="datetimeFigureOut">
               <a:rPr lang="pt-BR" smtClean="0"/>
-              <a:t>12/09/2019</a:t>
+              <a:t>16/09/2019</a:t>
             </a:fld>
             <a:endParaRPr lang="pt-BR"/>
           </a:p>
@@ -2049,7 +2054,7 @@
           <a:p>
             <a:fld id="{82869B3E-A76A-4689-B656-33BE798491C8}" type="datetimeFigureOut">
               <a:rPr lang="pt-BR" smtClean="0"/>
-              <a:t>12/09/2019</a:t>
+              <a:t>16/09/2019</a:t>
             </a:fld>
             <a:endParaRPr lang="pt-BR"/>
           </a:p>
@@ -2442,7 +2447,7 @@
           <a:p>
             <a:fld id="{82869B3E-A76A-4689-B656-33BE798491C8}" type="datetimeFigureOut">
               <a:rPr lang="pt-BR" smtClean="0"/>
-              <a:t>12/09/2019</a:t>
+              <a:t>16/09/2019</a:t>
             </a:fld>
             <a:endParaRPr lang="pt-BR"/>
           </a:p>
@@ -2612,7 +2617,7 @@
           <a:p>
             <a:fld id="{82869B3E-A76A-4689-B656-33BE798491C8}" type="datetimeFigureOut">
               <a:rPr lang="pt-BR" smtClean="0"/>
-              <a:t>12/09/2019</a:t>
+              <a:t>16/09/2019</a:t>
             </a:fld>
             <a:endParaRPr lang="pt-BR"/>
           </a:p>
@@ -2792,7 +2797,7 @@
           <a:p>
             <a:fld id="{82869B3E-A76A-4689-B656-33BE798491C8}" type="datetimeFigureOut">
               <a:rPr lang="pt-BR" smtClean="0"/>
-              <a:t>12/09/2019</a:t>
+              <a:t>16/09/2019</a:t>
             </a:fld>
             <a:endParaRPr lang="pt-BR"/>
           </a:p>
@@ -2968,7 +2973,7 @@
           <a:p>
             <a:fld id="{82869B3E-A76A-4689-B656-33BE798491C8}" type="datetimeFigureOut">
               <a:rPr lang="pt-BR" smtClean="0"/>
-              <a:t>12/09/2019</a:t>
+              <a:t>16/09/2019</a:t>
             </a:fld>
             <a:endParaRPr lang="pt-BR"/>
           </a:p>
@@ -3215,7 +3220,7 @@
           <a:p>
             <a:fld id="{82869B3E-A76A-4689-B656-33BE798491C8}" type="datetimeFigureOut">
               <a:rPr lang="pt-BR" smtClean="0"/>
-              <a:t>12/09/2019</a:t>
+              <a:t>16/09/2019</a:t>
             </a:fld>
             <a:endParaRPr lang="pt-BR"/>
           </a:p>
@@ -3447,7 +3452,7 @@
           <a:p>
             <a:fld id="{82869B3E-A76A-4689-B656-33BE798491C8}" type="datetimeFigureOut">
               <a:rPr lang="pt-BR" smtClean="0"/>
-              <a:t>12/09/2019</a:t>
+              <a:t>16/09/2019</a:t>
             </a:fld>
             <a:endParaRPr lang="pt-BR"/>
           </a:p>
@@ -3821,7 +3826,7 @@
           <a:p>
             <a:fld id="{82869B3E-A76A-4689-B656-33BE798491C8}" type="datetimeFigureOut">
               <a:rPr lang="pt-BR" smtClean="0"/>
-              <a:t>12/09/2019</a:t>
+              <a:t>16/09/2019</a:t>
             </a:fld>
             <a:endParaRPr lang="pt-BR"/>
           </a:p>
@@ -3944,7 +3949,7 @@
           <a:p>
             <a:fld id="{82869B3E-A76A-4689-B656-33BE798491C8}" type="datetimeFigureOut">
               <a:rPr lang="pt-BR" smtClean="0"/>
-              <a:t>12/09/2019</a:t>
+              <a:t>16/09/2019</a:t>
             </a:fld>
             <a:endParaRPr lang="pt-BR"/>
           </a:p>
@@ -4039,7 +4044,7 @@
           <a:p>
             <a:fld id="{82869B3E-A76A-4689-B656-33BE798491C8}" type="datetimeFigureOut">
               <a:rPr lang="pt-BR" smtClean="0"/>
-              <a:t>12/09/2019</a:t>
+              <a:t>16/09/2019</a:t>
             </a:fld>
             <a:endParaRPr lang="pt-BR"/>
           </a:p>
@@ -4294,7 +4299,7 @@
           <a:p>
             <a:fld id="{82869B3E-A76A-4689-B656-33BE798491C8}" type="datetimeFigureOut">
               <a:rPr lang="pt-BR" smtClean="0"/>
-              <a:t>12/09/2019</a:t>
+              <a:t>16/09/2019</a:t>
             </a:fld>
             <a:endParaRPr lang="pt-BR"/>
           </a:p>
@@ -4557,7 +4562,7 @@
           <a:p>
             <a:fld id="{82869B3E-A76A-4689-B656-33BE798491C8}" type="datetimeFigureOut">
               <a:rPr lang="pt-BR" smtClean="0"/>
-              <a:t>12/09/2019</a:t>
+              <a:t>16/09/2019</a:t>
             </a:fld>
             <a:endParaRPr lang="pt-BR"/>
           </a:p>
@@ -5300,7 +5305,7 @@
           <a:p>
             <a:fld id="{82869B3E-A76A-4689-B656-33BE798491C8}" type="datetimeFigureOut">
               <a:rPr lang="pt-BR" smtClean="0"/>
-              <a:t>12/09/2019</a:t>
+              <a:t>16/09/2019</a:t>
             </a:fld>
             <a:endParaRPr lang="pt-BR"/>
           </a:p>
@@ -5944,36 +5949,6 @@
           </a:prstGeom>
         </p:spPr>
       </p:pic>
-      <p:pic>
-        <p:nvPicPr>
-          <p:cNvPr id="28" name="Imagem 27"/>
-          <p:cNvPicPr>
-            <a:picLocks noChangeAspect="1"/>
-          </p:cNvPicPr>
-          <p:nvPr/>
-        </p:nvPicPr>
-        <p:blipFill>
-          <a:blip r:embed="rId6" cstate="print">
-            <a:extLst>
-              <a:ext uri="{28A0092B-C50C-407E-A947-70E740481C1C}">
-                <a14:useLocalDpi xmlns:a14="http://schemas.microsoft.com/office/drawing/2010/main" val="0"/>
-              </a:ext>
-            </a:extLst>
-          </a:blip>
-          <a:stretch>
-            <a:fillRect/>
-          </a:stretch>
-        </p:blipFill>
-        <p:spPr>
-          <a:xfrm>
-            <a:off x="4904797" y="1868198"/>
-            <a:ext cx="1089603" cy="1089603"/>
-          </a:xfrm>
-          <a:prstGeom prst="rect">
-            <a:avLst/>
-          </a:prstGeom>
-        </p:spPr>
-      </p:pic>
       <p:sp>
         <p:nvSpPr>
           <p:cNvPr id="29" name="Seta para a Esquerda 28"/>
@@ -6134,6 +6109,36 @@
           </a:p>
         </p:txBody>
       </p:sp>
+      <p:pic>
+        <p:nvPicPr>
+          <p:cNvPr id="4" name="Imagem 3"/>
+          <p:cNvPicPr>
+            <a:picLocks noChangeAspect="1"/>
+          </p:cNvPicPr>
+          <p:nvPr/>
+        </p:nvPicPr>
+        <p:blipFill>
+          <a:blip r:embed="rId6" cstate="print">
+            <a:extLst>
+              <a:ext uri="{28A0092B-C50C-407E-A947-70E740481C1C}">
+                <a14:useLocalDpi xmlns:a14="http://schemas.microsoft.com/office/drawing/2010/main" val="0"/>
+              </a:ext>
+            </a:extLst>
+          </a:blip>
+          <a:stretch>
+            <a:fillRect/>
+          </a:stretch>
+        </p:blipFill>
+        <p:spPr>
+          <a:xfrm>
+            <a:off x="4729761" y="1772717"/>
+            <a:ext cx="1157625" cy="1191874"/>
+          </a:xfrm>
+          <a:prstGeom prst="rect">
+            <a:avLst/>
+          </a:prstGeom>
+        </p:spPr>
+      </p:pic>
     </p:spTree>
     <p:extLst>
       <p:ext uri="{BB962C8B-B14F-4D97-AF65-F5344CB8AC3E}">

</xml_diff>